<commit_message>
gsfa example completed to 20
</commit_message>
<xml_diff>
--- a/figures/apc-gateways.pptx
+++ b/figures/apc-gateways.pptx
@@ -17266,8 +17266,8 @@
         </p:nvSpPr>
         <p:spPr>
           <a:xfrm>
-            <a:off x="7586715" y="1001039"/>
-            <a:ext cx="965109" cy="318924"/>
+            <a:off x="7586716" y="1001039"/>
+            <a:ext cx="623940" cy="442035"/>
           </a:xfrm>
           <a:prstGeom prst="rect">
             <a:avLst/>
@@ -17290,7 +17290,17 @@
                   <a:srgbClr val="7030A0"/>
                 </a:solidFill>
               </a:rPr>
-              <a:t>VPC Route Table:</a:t>
+              <a:t>VPC Route</a:t>
+            </a:r>
+          </a:p>
+          <a:p>
+            <a:r>
+              <a:rPr lang="en-US" sz="800" dirty="0">
+                <a:solidFill>
+                  <a:srgbClr val="7030A0"/>
+                </a:solidFill>
+              </a:rPr>
+              <a:t>Table:</a:t>
             </a:r>
             <a:br>
               <a:rPr lang="en-US" sz="800" dirty="0">
@@ -19615,8 +19625,8 @@
         </p:nvSpPr>
         <p:spPr>
           <a:xfrm>
-            <a:off x="7637096" y="4680264"/>
-            <a:ext cx="965109" cy="318924"/>
+            <a:off x="7611897" y="4556877"/>
+            <a:ext cx="594644" cy="442035"/>
           </a:xfrm>
           <a:prstGeom prst="rect">
             <a:avLst/>
@@ -19639,7 +19649,17 @@
                   <a:srgbClr val="7030A0"/>
                 </a:solidFill>
               </a:rPr>
-              <a:t>VPC Route Table:</a:t>
+              <a:t>VPC Route</a:t>
+            </a:r>
+          </a:p>
+          <a:p>
+            <a:r>
+              <a:rPr lang="en-US" sz="800" dirty="0">
+                <a:solidFill>
+                  <a:srgbClr val="7030A0"/>
+                </a:solidFill>
+              </a:rPr>
+              <a:t>Table:</a:t>
             </a:r>
             <a:br>
               <a:rPr lang="en-US" sz="800" dirty="0">
@@ -22414,7 +22434,7 @@
                   <a:srgbClr val="C00000"/>
                 </a:solidFill>
               </a:rPr>
-              <a:t>Security Group x1</a:t>
+              <a:t>Security Group y1</a:t>
             </a:r>
           </a:p>
         </p:txBody>
@@ -22453,7 +22473,7 @@
                   <a:srgbClr val="C00000"/>
                 </a:solidFill>
               </a:rPr>
-              <a:t>Security Group x2</a:t>
+              <a:t>Security Group y2</a:t>
             </a:r>
           </a:p>
         </p:txBody>
@@ -23270,7 +23290,7 @@
                   <a:srgbClr val="C00000"/>
                 </a:solidFill>
               </a:rPr>
-              <a:t>Security Group x0</a:t>
+              <a:t>Security Group y0</a:t>
             </a:r>
           </a:p>
         </p:txBody>
@@ -23736,7 +23756,7 @@
         </p:nvSpPr>
         <p:spPr>
           <a:xfrm>
-            <a:off x="2407727" y="2086740"/>
+            <a:off x="2470787" y="2014671"/>
             <a:ext cx="177800" cy="177800"/>
           </a:xfrm>
           <a:prstGeom prst="ellipse">
@@ -24056,6 +24076,1646 @@
             <a:r>
               <a:rPr lang="en-US" sz="800" dirty="0"/>
               <a:t>09</a:t>
+            </a:r>
+          </a:p>
+        </p:txBody>
+      </p:sp>
+      <p:sp>
+        <p:nvSpPr>
+          <p:cNvPr id="406" name="Oval 405">
+            <a:extLst>
+              <a:ext uri="{FF2B5EF4-FFF2-40B4-BE49-F238E27FC236}">
+                <a16:creationId xmlns:a16="http://schemas.microsoft.com/office/drawing/2014/main" id="{7EA130A2-9882-AD4D-ADDE-2BF33CAAEFEB}"/>
+              </a:ext>
+            </a:extLst>
+          </p:cNvPr>
+          <p:cNvSpPr/>
+          <p:nvPr/>
+        </p:nvSpPr>
+        <p:spPr>
+          <a:xfrm>
+            <a:off x="7551461" y="3367220"/>
+            <a:ext cx="177800" cy="177800"/>
+          </a:xfrm>
+          <a:prstGeom prst="ellipse">
+            <a:avLst/>
+          </a:prstGeom>
+          <a:solidFill>
+            <a:schemeClr val="accent6">
+              <a:lumMod val="50000"/>
+            </a:schemeClr>
+          </a:solidFill>
+          <a:ln>
+            <a:noFill/>
+          </a:ln>
+          <a:effectLst/>
+        </p:spPr>
+        <p:style>
+          <a:lnRef idx="1">
+            <a:schemeClr val="accent1"/>
+          </a:lnRef>
+          <a:fillRef idx="3">
+            <a:schemeClr val="accent1"/>
+          </a:fillRef>
+          <a:effectRef idx="2">
+            <a:schemeClr val="accent1"/>
+          </a:effectRef>
+          <a:fontRef idx="minor">
+            <a:schemeClr val="lt1"/>
+          </a:fontRef>
+        </p:style>
+        <p:txBody>
+          <a:bodyPr lIns="0" tIns="0" rIns="0" bIns="0" rtlCol="0" anchor="ctr"/>
+          <a:lstStyle/>
+          <a:p>
+            <a:pPr algn="ctr"/>
+            <a:r>
+              <a:rPr lang="en-US" sz="800" dirty="0"/>
+              <a:t>10</a:t>
+            </a:r>
+          </a:p>
+        </p:txBody>
+      </p:sp>
+      <p:sp>
+        <p:nvSpPr>
+          <p:cNvPr id="407" name="TextBox 9">
+            <a:extLst>
+              <a:ext uri="{FF2B5EF4-FFF2-40B4-BE49-F238E27FC236}">
+                <a16:creationId xmlns:a16="http://schemas.microsoft.com/office/drawing/2014/main" id="{9FF2B6E9-9BCB-624A-95B7-C3D43BEE45DC}"/>
+              </a:ext>
+            </a:extLst>
+          </p:cNvPr>
+          <p:cNvSpPr txBox="1">
+            <a:spLocks noChangeArrowheads="1"/>
+          </p:cNvSpPr>
+          <p:nvPr/>
+        </p:nvSpPr>
+        <p:spPr bwMode="auto">
+          <a:xfrm>
+            <a:off x="7831021" y="1389710"/>
+            <a:ext cx="307777" cy="1603635"/>
+          </a:xfrm>
+          <a:prstGeom prst="rect">
+            <a:avLst/>
+          </a:prstGeom>
+          <a:noFill/>
+          <a:ln>
+            <a:noFill/>
+          </a:ln>
+          <a:extLst>
+            <a:ext uri="{909E8E84-426E-40DD-AFC4-6F175D3DCCD1}">
+              <a14:hiddenFill xmlns:a14="http://schemas.microsoft.com/office/drawing/2010/main">
+                <a:solidFill>
+                  <a:srgbClr val="FFFFFF"/>
+                </a:solidFill>
+              </a14:hiddenFill>
+            </a:ext>
+            <a:ext uri="{91240B29-F687-4F45-9708-019B960494DF}">
+              <a14:hiddenLine xmlns:a14="http://schemas.microsoft.com/office/drawing/2010/main" w="9525">
+                <a:solidFill>
+                  <a:srgbClr val="000000"/>
+                </a:solidFill>
+                <a:miter lim="800000"/>
+                <a:headEnd/>
+                <a:tailEnd/>
+              </a14:hiddenLine>
+            </a:ext>
+          </a:extLst>
+        </p:spPr>
+        <p:txBody>
+          <a:bodyPr vert="vert" wrap="square">
+            <a:spAutoFit/>
+          </a:bodyPr>
+          <a:lstStyle>
+            <a:lvl1pPr>
+              <a:defRPr>
+                <a:solidFill>
+                  <a:schemeClr val="tx1"/>
+                </a:solidFill>
+                <a:latin typeface="Calibri" panose="020F0502020204030204" pitchFamily="34" charset="0"/>
+              </a:defRPr>
+            </a:lvl1pPr>
+            <a:lvl2pPr marL="742950" indent="-285750">
+              <a:defRPr>
+                <a:solidFill>
+                  <a:schemeClr val="tx1"/>
+                </a:solidFill>
+                <a:latin typeface="Calibri" panose="020F0502020204030204" pitchFamily="34" charset="0"/>
+              </a:defRPr>
+            </a:lvl2pPr>
+            <a:lvl3pPr marL="1143000" indent="-228600">
+              <a:defRPr>
+                <a:solidFill>
+                  <a:schemeClr val="tx1"/>
+                </a:solidFill>
+                <a:latin typeface="Calibri" panose="020F0502020204030204" pitchFamily="34" charset="0"/>
+              </a:defRPr>
+            </a:lvl3pPr>
+            <a:lvl4pPr marL="1600200" indent="-228600">
+              <a:defRPr>
+                <a:solidFill>
+                  <a:schemeClr val="tx1"/>
+                </a:solidFill>
+                <a:latin typeface="Calibri" panose="020F0502020204030204" pitchFamily="34" charset="0"/>
+              </a:defRPr>
+            </a:lvl4pPr>
+            <a:lvl5pPr marL="2057400" indent="-228600">
+              <a:defRPr>
+                <a:solidFill>
+                  <a:schemeClr val="tx1"/>
+                </a:solidFill>
+                <a:latin typeface="Calibri" panose="020F0502020204030204" pitchFamily="34" charset="0"/>
+              </a:defRPr>
+            </a:lvl5pPr>
+            <a:lvl6pPr marL="2514600" indent="-228600" eaLnBrk="0" fontAlgn="base" hangingPunct="0">
+              <a:spcBef>
+                <a:spcPct val="0"/>
+              </a:spcBef>
+              <a:spcAft>
+                <a:spcPct val="0"/>
+              </a:spcAft>
+              <a:defRPr>
+                <a:solidFill>
+                  <a:schemeClr val="tx1"/>
+                </a:solidFill>
+                <a:latin typeface="Calibri" panose="020F0502020204030204" pitchFamily="34" charset="0"/>
+              </a:defRPr>
+            </a:lvl6pPr>
+            <a:lvl7pPr marL="2971800" indent="-228600" eaLnBrk="0" fontAlgn="base" hangingPunct="0">
+              <a:spcBef>
+                <a:spcPct val="0"/>
+              </a:spcBef>
+              <a:spcAft>
+                <a:spcPct val="0"/>
+              </a:spcAft>
+              <a:defRPr>
+                <a:solidFill>
+                  <a:schemeClr val="tx1"/>
+                </a:solidFill>
+                <a:latin typeface="Calibri" panose="020F0502020204030204" pitchFamily="34" charset="0"/>
+              </a:defRPr>
+            </a:lvl7pPr>
+            <a:lvl8pPr marL="3429000" indent="-228600" eaLnBrk="0" fontAlgn="base" hangingPunct="0">
+              <a:spcBef>
+                <a:spcPct val="0"/>
+              </a:spcBef>
+              <a:spcAft>
+                <a:spcPct val="0"/>
+              </a:spcAft>
+              <a:defRPr>
+                <a:solidFill>
+                  <a:schemeClr val="tx1"/>
+                </a:solidFill>
+                <a:latin typeface="Calibri" panose="020F0502020204030204" pitchFamily="34" charset="0"/>
+              </a:defRPr>
+            </a:lvl8pPr>
+            <a:lvl9pPr marL="3886200" indent="-228600" eaLnBrk="0" fontAlgn="base" hangingPunct="0">
+              <a:spcBef>
+                <a:spcPct val="0"/>
+              </a:spcBef>
+              <a:spcAft>
+                <a:spcPct val="0"/>
+              </a:spcAft>
+              <a:defRPr>
+                <a:solidFill>
+                  <a:schemeClr val="tx1"/>
+                </a:solidFill>
+                <a:latin typeface="Calibri" panose="020F0502020204030204" pitchFamily="34" charset="0"/>
+              </a:defRPr>
+            </a:lvl9pPr>
+          </a:lstStyle>
+          <a:p>
+            <a:pPr algn="ctr" eaLnBrk="1" hangingPunct="1"/>
+            <a:r>
+              <a:rPr lang="en-US" altLang="en-US" sz="800" dirty="0">
+                <a:latin typeface="Arial" panose="020B0604020202020204" pitchFamily="34" charset="0"/>
+                <a:ea typeface="Amazon Ember" panose="020B0603020204020204" pitchFamily="34" charset="0"/>
+                <a:cs typeface="Arial" panose="020B0604020202020204" pitchFamily="34" charset="0"/>
+              </a:rPr>
+              <a:t>Autoscaling Group</a:t>
+            </a:r>
+          </a:p>
+        </p:txBody>
+      </p:sp>
+      <p:sp>
+        <p:nvSpPr>
+          <p:cNvPr id="408" name="TextBox 9">
+            <a:extLst>
+              <a:ext uri="{FF2B5EF4-FFF2-40B4-BE49-F238E27FC236}">
+                <a16:creationId xmlns:a16="http://schemas.microsoft.com/office/drawing/2014/main" id="{3FEFA673-D091-4643-82C7-EB85BC704894}"/>
+              </a:ext>
+            </a:extLst>
+          </p:cNvPr>
+          <p:cNvSpPr txBox="1">
+            <a:spLocks noChangeArrowheads="1"/>
+          </p:cNvSpPr>
+          <p:nvPr/>
+        </p:nvSpPr>
+        <p:spPr bwMode="auto">
+          <a:xfrm>
+            <a:off x="7286903" y="2772766"/>
+            <a:ext cx="735247" cy="461665"/>
+          </a:xfrm>
+          <a:prstGeom prst="rect">
+            <a:avLst/>
+          </a:prstGeom>
+          <a:noFill/>
+          <a:ln>
+            <a:noFill/>
+          </a:ln>
+          <a:extLst>
+            <a:ext uri="{909E8E84-426E-40DD-AFC4-6F175D3DCCD1}">
+              <a14:hiddenFill xmlns:a14="http://schemas.microsoft.com/office/drawing/2010/main">
+                <a:solidFill>
+                  <a:srgbClr val="FFFFFF"/>
+                </a:solidFill>
+              </a14:hiddenFill>
+            </a:ext>
+            <a:ext uri="{91240B29-F687-4F45-9708-019B960494DF}">
+              <a14:hiddenLine xmlns:a14="http://schemas.microsoft.com/office/drawing/2010/main" w="9525">
+                <a:solidFill>
+                  <a:srgbClr val="000000"/>
+                </a:solidFill>
+                <a:miter lim="800000"/>
+                <a:headEnd/>
+                <a:tailEnd/>
+              </a14:hiddenLine>
+            </a:ext>
+          </a:extLst>
+        </p:spPr>
+        <p:txBody>
+          <a:bodyPr wrap="square">
+            <a:spAutoFit/>
+          </a:bodyPr>
+          <a:lstStyle>
+            <a:lvl1pPr>
+              <a:defRPr>
+                <a:solidFill>
+                  <a:schemeClr val="tx1"/>
+                </a:solidFill>
+                <a:latin typeface="Calibri" panose="020F0502020204030204" pitchFamily="34" charset="0"/>
+              </a:defRPr>
+            </a:lvl1pPr>
+            <a:lvl2pPr marL="742950" indent="-285750">
+              <a:defRPr>
+                <a:solidFill>
+                  <a:schemeClr val="tx1"/>
+                </a:solidFill>
+                <a:latin typeface="Calibri" panose="020F0502020204030204" pitchFamily="34" charset="0"/>
+              </a:defRPr>
+            </a:lvl2pPr>
+            <a:lvl3pPr marL="1143000" indent="-228600">
+              <a:defRPr>
+                <a:solidFill>
+                  <a:schemeClr val="tx1"/>
+                </a:solidFill>
+                <a:latin typeface="Calibri" panose="020F0502020204030204" pitchFamily="34" charset="0"/>
+              </a:defRPr>
+            </a:lvl3pPr>
+            <a:lvl4pPr marL="1600200" indent="-228600">
+              <a:defRPr>
+                <a:solidFill>
+                  <a:schemeClr val="tx1"/>
+                </a:solidFill>
+                <a:latin typeface="Calibri" panose="020F0502020204030204" pitchFamily="34" charset="0"/>
+              </a:defRPr>
+            </a:lvl4pPr>
+            <a:lvl5pPr marL="2057400" indent="-228600">
+              <a:defRPr>
+                <a:solidFill>
+                  <a:schemeClr val="tx1"/>
+                </a:solidFill>
+                <a:latin typeface="Calibri" panose="020F0502020204030204" pitchFamily="34" charset="0"/>
+              </a:defRPr>
+            </a:lvl5pPr>
+            <a:lvl6pPr marL="2514600" indent="-228600" eaLnBrk="0" fontAlgn="base" hangingPunct="0">
+              <a:spcBef>
+                <a:spcPct val="0"/>
+              </a:spcBef>
+              <a:spcAft>
+                <a:spcPct val="0"/>
+              </a:spcAft>
+              <a:defRPr>
+                <a:solidFill>
+                  <a:schemeClr val="tx1"/>
+                </a:solidFill>
+                <a:latin typeface="Calibri" panose="020F0502020204030204" pitchFamily="34" charset="0"/>
+              </a:defRPr>
+            </a:lvl6pPr>
+            <a:lvl7pPr marL="2971800" indent="-228600" eaLnBrk="0" fontAlgn="base" hangingPunct="0">
+              <a:spcBef>
+                <a:spcPct val="0"/>
+              </a:spcBef>
+              <a:spcAft>
+                <a:spcPct val="0"/>
+              </a:spcAft>
+              <a:defRPr>
+                <a:solidFill>
+                  <a:schemeClr val="tx1"/>
+                </a:solidFill>
+                <a:latin typeface="Calibri" panose="020F0502020204030204" pitchFamily="34" charset="0"/>
+              </a:defRPr>
+            </a:lvl7pPr>
+            <a:lvl8pPr marL="3429000" indent="-228600" eaLnBrk="0" fontAlgn="base" hangingPunct="0">
+              <a:spcBef>
+                <a:spcPct val="0"/>
+              </a:spcBef>
+              <a:spcAft>
+                <a:spcPct val="0"/>
+              </a:spcAft>
+              <a:defRPr>
+                <a:solidFill>
+                  <a:schemeClr val="tx1"/>
+                </a:solidFill>
+                <a:latin typeface="Calibri" panose="020F0502020204030204" pitchFamily="34" charset="0"/>
+              </a:defRPr>
+            </a:lvl8pPr>
+            <a:lvl9pPr marL="3886200" indent="-228600" eaLnBrk="0" fontAlgn="base" hangingPunct="0">
+              <a:spcBef>
+                <a:spcPct val="0"/>
+              </a:spcBef>
+              <a:spcAft>
+                <a:spcPct val="0"/>
+              </a:spcAft>
+              <a:defRPr>
+                <a:solidFill>
+                  <a:schemeClr val="tx1"/>
+                </a:solidFill>
+                <a:latin typeface="Calibri" panose="020F0502020204030204" pitchFamily="34" charset="0"/>
+              </a:defRPr>
+            </a:lvl9pPr>
+          </a:lstStyle>
+          <a:p>
+            <a:pPr algn="ctr" eaLnBrk="1" hangingPunct="1"/>
+            <a:r>
+              <a:rPr lang="en-US" altLang="en-US" sz="800" dirty="0">
+                <a:latin typeface="Arial" panose="020B0604020202020204" pitchFamily="34" charset="0"/>
+                <a:ea typeface="Amazon Ember" panose="020B0603020204020204" pitchFamily="34" charset="0"/>
+                <a:cs typeface="Arial" panose="020B0604020202020204" pitchFamily="34" charset="0"/>
+              </a:rPr>
+              <a:t>Virtual Firewall Appliances</a:t>
+            </a:r>
+          </a:p>
+        </p:txBody>
+      </p:sp>
+      <p:sp>
+        <p:nvSpPr>
+          <p:cNvPr id="409" name="Oval 408">
+            <a:extLst>
+              <a:ext uri="{FF2B5EF4-FFF2-40B4-BE49-F238E27FC236}">
+                <a16:creationId xmlns:a16="http://schemas.microsoft.com/office/drawing/2014/main" id="{FF5F1CA7-F9F0-244A-8391-2F908B28DE37}"/>
+              </a:ext>
+            </a:extLst>
+          </p:cNvPr>
+          <p:cNvSpPr/>
+          <p:nvPr/>
+        </p:nvSpPr>
+        <p:spPr>
+          <a:xfrm>
+            <a:off x="6865034" y="1781510"/>
+            <a:ext cx="177800" cy="177800"/>
+          </a:xfrm>
+          <a:prstGeom prst="ellipse">
+            <a:avLst/>
+          </a:prstGeom>
+          <a:solidFill>
+            <a:schemeClr val="accent6">
+              <a:lumMod val="50000"/>
+            </a:schemeClr>
+          </a:solidFill>
+          <a:ln>
+            <a:noFill/>
+          </a:ln>
+          <a:effectLst/>
+        </p:spPr>
+        <p:style>
+          <a:lnRef idx="1">
+            <a:schemeClr val="accent1"/>
+          </a:lnRef>
+          <a:fillRef idx="3">
+            <a:schemeClr val="accent1"/>
+          </a:fillRef>
+          <a:effectRef idx="2">
+            <a:schemeClr val="accent1"/>
+          </a:effectRef>
+          <a:fontRef idx="minor">
+            <a:schemeClr val="lt1"/>
+          </a:fontRef>
+        </p:style>
+        <p:txBody>
+          <a:bodyPr lIns="0" tIns="0" rIns="0" bIns="0" rtlCol="0" anchor="ctr"/>
+          <a:lstStyle/>
+          <a:p>
+            <a:pPr algn="ctr"/>
+            <a:r>
+              <a:rPr lang="en-US" sz="800" dirty="0"/>
+              <a:t>11</a:t>
+            </a:r>
+          </a:p>
+        </p:txBody>
+      </p:sp>
+      <p:grpSp>
+        <p:nvGrpSpPr>
+          <p:cNvPr id="410" name="Group 409">
+            <a:extLst>
+              <a:ext uri="{FF2B5EF4-FFF2-40B4-BE49-F238E27FC236}">
+                <a16:creationId xmlns:a16="http://schemas.microsoft.com/office/drawing/2014/main" id="{EA258FA5-3063-3A4C-A5F4-F013A47F9884}"/>
+              </a:ext>
+            </a:extLst>
+          </p:cNvPr>
+          <p:cNvGrpSpPr/>
+          <p:nvPr/>
+        </p:nvGrpSpPr>
+        <p:grpSpPr>
+          <a:xfrm>
+            <a:off x="8594615" y="1338989"/>
+            <a:ext cx="159187" cy="141870"/>
+            <a:chOff x="1806125" y="1409251"/>
+            <a:chExt cx="180000" cy="141870"/>
+          </a:xfrm>
+          <a:solidFill>
+            <a:srgbClr val="FFFFFF">
+              <a:alpha val="70000"/>
+            </a:srgbClr>
+          </a:solidFill>
+        </p:grpSpPr>
+        <p:sp>
+          <p:nvSpPr>
+            <p:cNvPr id="411" name="Rectangle 410">
+              <a:extLst>
+                <a:ext uri="{FF2B5EF4-FFF2-40B4-BE49-F238E27FC236}">
+                  <a16:creationId xmlns:a16="http://schemas.microsoft.com/office/drawing/2014/main" id="{DC1AAC49-1BC8-C244-A2D3-1EDDCAFE016C}"/>
+                </a:ext>
+              </a:extLst>
+            </p:cNvPr>
+            <p:cNvSpPr/>
+            <p:nvPr/>
+          </p:nvSpPr>
+          <p:spPr>
+            <a:xfrm>
+              <a:off x="1806125" y="1409251"/>
+              <a:ext cx="180000" cy="36000"/>
+            </a:xfrm>
+            <a:prstGeom prst="rect">
+              <a:avLst/>
+            </a:prstGeom>
+            <a:grpFill/>
+            <a:ln w="3175">
+              <a:solidFill>
+                <a:srgbClr val="7030A0"/>
+              </a:solidFill>
+            </a:ln>
+            <a:effectLst/>
+          </p:spPr>
+          <p:style>
+            <a:lnRef idx="1">
+              <a:schemeClr val="accent1"/>
+            </a:lnRef>
+            <a:fillRef idx="3">
+              <a:schemeClr val="accent1"/>
+            </a:fillRef>
+            <a:effectRef idx="2">
+              <a:schemeClr val="accent1"/>
+            </a:effectRef>
+            <a:fontRef idx="minor">
+              <a:schemeClr val="lt1"/>
+            </a:fontRef>
+          </p:style>
+          <p:txBody>
+            <a:bodyPr rtlCol="0" anchor="ctr"/>
+            <a:lstStyle/>
+            <a:p>
+              <a:pPr algn="ctr"/>
+              <a:endParaRPr lang="en-US" dirty="0"/>
+            </a:p>
+          </p:txBody>
+        </p:sp>
+        <p:sp>
+          <p:nvSpPr>
+            <p:cNvPr id="412" name="Rectangle 411">
+              <a:extLst>
+                <a:ext uri="{FF2B5EF4-FFF2-40B4-BE49-F238E27FC236}">
+                  <a16:creationId xmlns:a16="http://schemas.microsoft.com/office/drawing/2014/main" id="{1A1727A1-5304-4944-BBC4-A6034F8D0755}"/>
+                </a:ext>
+              </a:extLst>
+            </p:cNvPr>
+            <p:cNvSpPr/>
+            <p:nvPr/>
+          </p:nvSpPr>
+          <p:spPr>
+            <a:xfrm>
+              <a:off x="1806125" y="1460441"/>
+              <a:ext cx="180000" cy="36000"/>
+            </a:xfrm>
+            <a:prstGeom prst="rect">
+              <a:avLst/>
+            </a:prstGeom>
+            <a:grpFill/>
+            <a:ln w="3175">
+              <a:solidFill>
+                <a:srgbClr val="7030A0"/>
+              </a:solidFill>
+            </a:ln>
+            <a:effectLst/>
+          </p:spPr>
+          <p:style>
+            <a:lnRef idx="1">
+              <a:schemeClr val="accent1"/>
+            </a:lnRef>
+            <a:fillRef idx="3">
+              <a:schemeClr val="accent1"/>
+            </a:fillRef>
+            <a:effectRef idx="2">
+              <a:schemeClr val="accent1"/>
+            </a:effectRef>
+            <a:fontRef idx="minor">
+              <a:schemeClr val="lt1"/>
+            </a:fontRef>
+          </p:style>
+          <p:txBody>
+            <a:bodyPr rtlCol="0" anchor="ctr"/>
+            <a:lstStyle/>
+            <a:p>
+              <a:pPr algn="ctr"/>
+              <a:endParaRPr lang="en-US" dirty="0"/>
+            </a:p>
+          </p:txBody>
+        </p:sp>
+        <p:sp>
+          <p:nvSpPr>
+            <p:cNvPr id="413" name="Rectangle 412">
+              <a:extLst>
+                <a:ext uri="{FF2B5EF4-FFF2-40B4-BE49-F238E27FC236}">
+                  <a16:creationId xmlns:a16="http://schemas.microsoft.com/office/drawing/2014/main" id="{4F77C477-2BBE-454F-ACA2-D70E1257DF5F}"/>
+                </a:ext>
+              </a:extLst>
+            </p:cNvPr>
+            <p:cNvSpPr/>
+            <p:nvPr/>
+          </p:nvSpPr>
+          <p:spPr>
+            <a:xfrm>
+              <a:off x="1806125" y="1515121"/>
+              <a:ext cx="180000" cy="36000"/>
+            </a:xfrm>
+            <a:prstGeom prst="rect">
+              <a:avLst/>
+            </a:prstGeom>
+            <a:grpFill/>
+            <a:ln w="3175">
+              <a:solidFill>
+                <a:srgbClr val="7030A0"/>
+              </a:solidFill>
+            </a:ln>
+            <a:effectLst/>
+          </p:spPr>
+          <p:style>
+            <a:lnRef idx="1">
+              <a:schemeClr val="accent1"/>
+            </a:lnRef>
+            <a:fillRef idx="3">
+              <a:schemeClr val="accent1"/>
+            </a:fillRef>
+            <a:effectRef idx="2">
+              <a:schemeClr val="accent1"/>
+            </a:effectRef>
+            <a:fontRef idx="minor">
+              <a:schemeClr val="lt1"/>
+            </a:fontRef>
+          </p:style>
+          <p:txBody>
+            <a:bodyPr rtlCol="0" anchor="ctr"/>
+            <a:lstStyle/>
+            <a:p>
+              <a:pPr algn="ctr"/>
+              <a:endParaRPr lang="en-US" dirty="0"/>
+            </a:p>
+          </p:txBody>
+        </p:sp>
+      </p:grpSp>
+      <p:sp>
+        <p:nvSpPr>
+          <p:cNvPr id="414" name="TextBox 413">
+            <a:extLst>
+              <a:ext uri="{FF2B5EF4-FFF2-40B4-BE49-F238E27FC236}">
+                <a16:creationId xmlns:a16="http://schemas.microsoft.com/office/drawing/2014/main" id="{D3CA5E93-DCAD-D14C-8995-76329446422F}"/>
+              </a:ext>
+            </a:extLst>
+          </p:cNvPr>
+          <p:cNvSpPr txBox="1"/>
+          <p:nvPr/>
+        </p:nvSpPr>
+        <p:spPr>
+          <a:xfrm>
+            <a:off x="8408362" y="877705"/>
+            <a:ext cx="623940" cy="442035"/>
+          </a:xfrm>
+          <a:prstGeom prst="rect">
+            <a:avLst/>
+          </a:prstGeom>
+          <a:solidFill>
+            <a:srgbClr val="DCDEE2">
+              <a:alpha val="40000"/>
+            </a:srgbClr>
+          </a:solidFill>
+        </p:spPr>
+        <p:txBody>
+          <a:bodyPr wrap="square" lIns="0" tIns="36000" rIns="0" bIns="36000" rtlCol="0">
+            <a:spAutoFit/>
+          </a:bodyPr>
+          <a:lstStyle/>
+          <a:p>
+            <a:r>
+              <a:rPr lang="en-US" sz="800" dirty="0">
+                <a:solidFill>
+                  <a:srgbClr val="7030A0"/>
+                </a:solidFill>
+              </a:rPr>
+              <a:t>VPC Route</a:t>
+            </a:r>
+          </a:p>
+          <a:p>
+            <a:r>
+              <a:rPr lang="en-US" sz="800" dirty="0">
+                <a:solidFill>
+                  <a:srgbClr val="7030A0"/>
+                </a:solidFill>
+              </a:rPr>
+              <a:t>Table:</a:t>
+            </a:r>
+            <a:br>
+              <a:rPr lang="en-US" sz="800" dirty="0">
+                <a:solidFill>
+                  <a:srgbClr val="7030A0"/>
+                </a:solidFill>
+              </a:rPr>
+            </a:br>
+            <a:r>
+              <a:rPr lang="en-US" sz="800" dirty="0">
+                <a:solidFill>
+                  <a:srgbClr val="7030A0"/>
+                </a:solidFill>
+              </a:rPr>
+              <a:t>NAT-a</a:t>
+            </a:r>
+          </a:p>
+        </p:txBody>
+      </p:sp>
+      <p:grpSp>
+        <p:nvGrpSpPr>
+          <p:cNvPr id="415" name="Group 414">
+            <a:extLst>
+              <a:ext uri="{FF2B5EF4-FFF2-40B4-BE49-F238E27FC236}">
+                <a16:creationId xmlns:a16="http://schemas.microsoft.com/office/drawing/2014/main" id="{29F58F1E-995A-F844-8D9D-5A01E72C6628}"/>
+              </a:ext>
+            </a:extLst>
+          </p:cNvPr>
+          <p:cNvGrpSpPr/>
+          <p:nvPr/>
+        </p:nvGrpSpPr>
+        <p:grpSpPr>
+          <a:xfrm>
+            <a:off x="8618422" y="4547748"/>
+            <a:ext cx="159187" cy="141870"/>
+            <a:chOff x="1806125" y="1409251"/>
+            <a:chExt cx="180000" cy="141870"/>
+          </a:xfrm>
+          <a:solidFill>
+            <a:srgbClr val="FFFFFF">
+              <a:alpha val="70000"/>
+            </a:srgbClr>
+          </a:solidFill>
+        </p:grpSpPr>
+        <p:sp>
+          <p:nvSpPr>
+            <p:cNvPr id="416" name="Rectangle 415">
+              <a:extLst>
+                <a:ext uri="{FF2B5EF4-FFF2-40B4-BE49-F238E27FC236}">
+                  <a16:creationId xmlns:a16="http://schemas.microsoft.com/office/drawing/2014/main" id="{7C628056-86C6-F344-841D-D01F1578C064}"/>
+                </a:ext>
+              </a:extLst>
+            </p:cNvPr>
+            <p:cNvSpPr/>
+            <p:nvPr/>
+          </p:nvSpPr>
+          <p:spPr>
+            <a:xfrm>
+              <a:off x="1806125" y="1409251"/>
+              <a:ext cx="180000" cy="36000"/>
+            </a:xfrm>
+            <a:prstGeom prst="rect">
+              <a:avLst/>
+            </a:prstGeom>
+            <a:grpFill/>
+            <a:ln w="3175">
+              <a:solidFill>
+                <a:srgbClr val="7030A0"/>
+              </a:solidFill>
+            </a:ln>
+            <a:effectLst/>
+          </p:spPr>
+          <p:style>
+            <a:lnRef idx="1">
+              <a:schemeClr val="accent1"/>
+            </a:lnRef>
+            <a:fillRef idx="3">
+              <a:schemeClr val="accent1"/>
+            </a:fillRef>
+            <a:effectRef idx="2">
+              <a:schemeClr val="accent1"/>
+            </a:effectRef>
+            <a:fontRef idx="minor">
+              <a:schemeClr val="lt1"/>
+            </a:fontRef>
+          </p:style>
+          <p:txBody>
+            <a:bodyPr rtlCol="0" anchor="ctr"/>
+            <a:lstStyle/>
+            <a:p>
+              <a:pPr algn="ctr"/>
+              <a:endParaRPr lang="en-US" dirty="0"/>
+            </a:p>
+          </p:txBody>
+        </p:sp>
+        <p:sp>
+          <p:nvSpPr>
+            <p:cNvPr id="417" name="Rectangle 416">
+              <a:extLst>
+                <a:ext uri="{FF2B5EF4-FFF2-40B4-BE49-F238E27FC236}">
+                  <a16:creationId xmlns:a16="http://schemas.microsoft.com/office/drawing/2014/main" id="{B128C384-A615-D640-8390-D529239DB140}"/>
+                </a:ext>
+              </a:extLst>
+            </p:cNvPr>
+            <p:cNvSpPr/>
+            <p:nvPr/>
+          </p:nvSpPr>
+          <p:spPr>
+            <a:xfrm>
+              <a:off x="1806125" y="1460441"/>
+              <a:ext cx="180000" cy="36000"/>
+            </a:xfrm>
+            <a:prstGeom prst="rect">
+              <a:avLst/>
+            </a:prstGeom>
+            <a:grpFill/>
+            <a:ln w="3175">
+              <a:solidFill>
+                <a:srgbClr val="7030A0"/>
+              </a:solidFill>
+            </a:ln>
+            <a:effectLst/>
+          </p:spPr>
+          <p:style>
+            <a:lnRef idx="1">
+              <a:schemeClr val="accent1"/>
+            </a:lnRef>
+            <a:fillRef idx="3">
+              <a:schemeClr val="accent1"/>
+            </a:fillRef>
+            <a:effectRef idx="2">
+              <a:schemeClr val="accent1"/>
+            </a:effectRef>
+            <a:fontRef idx="minor">
+              <a:schemeClr val="lt1"/>
+            </a:fontRef>
+          </p:style>
+          <p:txBody>
+            <a:bodyPr rtlCol="0" anchor="ctr"/>
+            <a:lstStyle/>
+            <a:p>
+              <a:pPr algn="ctr"/>
+              <a:endParaRPr lang="en-US" dirty="0"/>
+            </a:p>
+          </p:txBody>
+        </p:sp>
+        <p:sp>
+          <p:nvSpPr>
+            <p:cNvPr id="418" name="Rectangle 417">
+              <a:extLst>
+                <a:ext uri="{FF2B5EF4-FFF2-40B4-BE49-F238E27FC236}">
+                  <a16:creationId xmlns:a16="http://schemas.microsoft.com/office/drawing/2014/main" id="{89876E54-8D3F-8C41-83B8-89E389CE4B00}"/>
+                </a:ext>
+              </a:extLst>
+            </p:cNvPr>
+            <p:cNvSpPr/>
+            <p:nvPr/>
+          </p:nvSpPr>
+          <p:spPr>
+            <a:xfrm>
+              <a:off x="1806125" y="1515121"/>
+              <a:ext cx="180000" cy="36000"/>
+            </a:xfrm>
+            <a:prstGeom prst="rect">
+              <a:avLst/>
+            </a:prstGeom>
+            <a:grpFill/>
+            <a:ln w="3175">
+              <a:solidFill>
+                <a:srgbClr val="7030A0"/>
+              </a:solidFill>
+            </a:ln>
+            <a:effectLst/>
+          </p:spPr>
+          <p:style>
+            <a:lnRef idx="1">
+              <a:schemeClr val="accent1"/>
+            </a:lnRef>
+            <a:fillRef idx="3">
+              <a:schemeClr val="accent1"/>
+            </a:fillRef>
+            <a:effectRef idx="2">
+              <a:schemeClr val="accent1"/>
+            </a:effectRef>
+            <a:fontRef idx="minor">
+              <a:schemeClr val="lt1"/>
+            </a:fontRef>
+          </p:style>
+          <p:txBody>
+            <a:bodyPr rtlCol="0" anchor="ctr"/>
+            <a:lstStyle/>
+            <a:p>
+              <a:pPr algn="ctr"/>
+              <a:endParaRPr lang="en-US" dirty="0"/>
+            </a:p>
+          </p:txBody>
+        </p:sp>
+      </p:grpSp>
+      <p:sp>
+        <p:nvSpPr>
+          <p:cNvPr id="419" name="TextBox 418">
+            <a:extLst>
+              <a:ext uri="{FF2B5EF4-FFF2-40B4-BE49-F238E27FC236}">
+                <a16:creationId xmlns:a16="http://schemas.microsoft.com/office/drawing/2014/main" id="{60987FDD-C86B-FD46-B0AF-93B964583CB2}"/>
+              </a:ext>
+            </a:extLst>
+          </p:cNvPr>
+          <p:cNvSpPr txBox="1"/>
+          <p:nvPr/>
+        </p:nvSpPr>
+        <p:spPr>
+          <a:xfrm>
+            <a:off x="8394802" y="4630484"/>
+            <a:ext cx="623940" cy="442035"/>
+          </a:xfrm>
+          <a:prstGeom prst="rect">
+            <a:avLst/>
+          </a:prstGeom>
+          <a:solidFill>
+            <a:srgbClr val="DCDEE2">
+              <a:alpha val="40000"/>
+            </a:srgbClr>
+          </a:solidFill>
+        </p:spPr>
+        <p:txBody>
+          <a:bodyPr wrap="square" lIns="0" tIns="36000" rIns="0" bIns="36000" rtlCol="0">
+            <a:spAutoFit/>
+          </a:bodyPr>
+          <a:lstStyle/>
+          <a:p>
+            <a:r>
+              <a:rPr lang="en-US" sz="800" dirty="0">
+                <a:solidFill>
+                  <a:srgbClr val="7030A0"/>
+                </a:solidFill>
+              </a:rPr>
+              <a:t>VPC Route</a:t>
+            </a:r>
+          </a:p>
+          <a:p>
+            <a:r>
+              <a:rPr lang="en-US" sz="800" dirty="0">
+                <a:solidFill>
+                  <a:srgbClr val="7030A0"/>
+                </a:solidFill>
+              </a:rPr>
+              <a:t>Table:</a:t>
+            </a:r>
+            <a:br>
+              <a:rPr lang="en-US" sz="800" dirty="0">
+                <a:solidFill>
+                  <a:srgbClr val="7030A0"/>
+                </a:solidFill>
+              </a:rPr>
+            </a:br>
+            <a:r>
+              <a:rPr lang="en-US" sz="800" dirty="0">
+                <a:solidFill>
+                  <a:srgbClr val="7030A0"/>
+                </a:solidFill>
+              </a:rPr>
+              <a:t>NAT-b</a:t>
+            </a:r>
+          </a:p>
+        </p:txBody>
+      </p:sp>
+      <p:sp>
+        <p:nvSpPr>
+          <p:cNvPr id="420" name="Oval 419">
+            <a:extLst>
+              <a:ext uri="{FF2B5EF4-FFF2-40B4-BE49-F238E27FC236}">
+                <a16:creationId xmlns:a16="http://schemas.microsoft.com/office/drawing/2014/main" id="{67054A9E-CC54-7449-8407-5B9251F309B0}"/>
+              </a:ext>
+            </a:extLst>
+          </p:cNvPr>
+          <p:cNvSpPr/>
+          <p:nvPr/>
+        </p:nvSpPr>
+        <p:spPr>
+          <a:xfrm>
+            <a:off x="8204209" y="2031186"/>
+            <a:ext cx="177800" cy="177800"/>
+          </a:xfrm>
+          <a:prstGeom prst="ellipse">
+            <a:avLst/>
+          </a:prstGeom>
+          <a:solidFill>
+            <a:schemeClr val="accent6">
+              <a:lumMod val="50000"/>
+            </a:schemeClr>
+          </a:solidFill>
+          <a:ln>
+            <a:noFill/>
+          </a:ln>
+          <a:effectLst/>
+        </p:spPr>
+        <p:style>
+          <a:lnRef idx="1">
+            <a:schemeClr val="accent1"/>
+          </a:lnRef>
+          <a:fillRef idx="3">
+            <a:schemeClr val="accent1"/>
+          </a:fillRef>
+          <a:effectRef idx="2">
+            <a:schemeClr val="accent1"/>
+          </a:effectRef>
+          <a:fontRef idx="minor">
+            <a:schemeClr val="lt1"/>
+          </a:fontRef>
+        </p:style>
+        <p:txBody>
+          <a:bodyPr lIns="0" tIns="0" rIns="0" bIns="0" rtlCol="0" anchor="ctr"/>
+          <a:lstStyle/>
+          <a:p>
+            <a:pPr algn="ctr"/>
+            <a:r>
+              <a:rPr lang="en-US" sz="800" dirty="0"/>
+              <a:t>12</a:t>
+            </a:r>
+          </a:p>
+        </p:txBody>
+      </p:sp>
+      <p:sp>
+        <p:nvSpPr>
+          <p:cNvPr id="421" name="Oval 420">
+            <a:extLst>
+              <a:ext uri="{FF2B5EF4-FFF2-40B4-BE49-F238E27FC236}">
+                <a16:creationId xmlns:a16="http://schemas.microsoft.com/office/drawing/2014/main" id="{BEB9140E-B82F-DE45-A60A-F2B8519559A3}"/>
+              </a:ext>
+            </a:extLst>
+          </p:cNvPr>
+          <p:cNvSpPr/>
+          <p:nvPr/>
+        </p:nvSpPr>
+        <p:spPr>
+          <a:xfrm>
+            <a:off x="5179391" y="3982200"/>
+            <a:ext cx="177800" cy="177800"/>
+          </a:xfrm>
+          <a:prstGeom prst="ellipse">
+            <a:avLst/>
+          </a:prstGeom>
+          <a:solidFill>
+            <a:schemeClr val="accent6">
+              <a:lumMod val="50000"/>
+            </a:schemeClr>
+          </a:solidFill>
+          <a:ln>
+            <a:noFill/>
+          </a:ln>
+          <a:effectLst/>
+        </p:spPr>
+        <p:style>
+          <a:lnRef idx="1">
+            <a:schemeClr val="accent1"/>
+          </a:lnRef>
+          <a:fillRef idx="3">
+            <a:schemeClr val="accent1"/>
+          </a:fillRef>
+          <a:effectRef idx="2">
+            <a:schemeClr val="accent1"/>
+          </a:effectRef>
+          <a:fontRef idx="minor">
+            <a:schemeClr val="lt1"/>
+          </a:fontRef>
+        </p:style>
+        <p:txBody>
+          <a:bodyPr lIns="0" tIns="0" rIns="0" bIns="0" rtlCol="0" anchor="ctr"/>
+          <a:lstStyle/>
+          <a:p>
+            <a:pPr algn="ctr"/>
+            <a:r>
+              <a:rPr lang="en-US" sz="800" dirty="0"/>
+              <a:t>14</a:t>
+            </a:r>
+          </a:p>
+        </p:txBody>
+      </p:sp>
+      <p:sp>
+        <p:nvSpPr>
+          <p:cNvPr id="423" name="Oval 422">
+            <a:extLst>
+              <a:ext uri="{FF2B5EF4-FFF2-40B4-BE49-F238E27FC236}">
+                <a16:creationId xmlns:a16="http://schemas.microsoft.com/office/drawing/2014/main" id="{D8FEEA65-7DB7-0F47-9F05-995AFB346C8F}"/>
+              </a:ext>
+            </a:extLst>
+          </p:cNvPr>
+          <p:cNvSpPr/>
+          <p:nvPr/>
+        </p:nvSpPr>
+        <p:spPr>
+          <a:xfrm>
+            <a:off x="1547796" y="1329655"/>
+            <a:ext cx="177800" cy="177800"/>
+          </a:xfrm>
+          <a:prstGeom prst="ellipse">
+            <a:avLst/>
+          </a:prstGeom>
+          <a:solidFill>
+            <a:schemeClr val="accent6">
+              <a:lumMod val="50000"/>
+            </a:schemeClr>
+          </a:solidFill>
+          <a:ln>
+            <a:noFill/>
+          </a:ln>
+          <a:effectLst/>
+        </p:spPr>
+        <p:style>
+          <a:lnRef idx="1">
+            <a:schemeClr val="accent1"/>
+          </a:lnRef>
+          <a:fillRef idx="3">
+            <a:schemeClr val="accent1"/>
+          </a:fillRef>
+          <a:effectRef idx="2">
+            <a:schemeClr val="accent1"/>
+          </a:effectRef>
+          <a:fontRef idx="minor">
+            <a:schemeClr val="lt1"/>
+          </a:fontRef>
+        </p:style>
+        <p:txBody>
+          <a:bodyPr lIns="0" tIns="0" rIns="0" bIns="0" rtlCol="0" anchor="ctr"/>
+          <a:lstStyle/>
+          <a:p>
+            <a:pPr algn="ctr"/>
+            <a:r>
+              <a:rPr lang="en-US" sz="800" dirty="0"/>
+              <a:t>15</a:t>
+            </a:r>
+          </a:p>
+        </p:txBody>
+      </p:sp>
+      <p:sp>
+        <p:nvSpPr>
+          <p:cNvPr id="424" name="TextBox 9">
+            <a:extLst>
+              <a:ext uri="{FF2B5EF4-FFF2-40B4-BE49-F238E27FC236}">
+                <a16:creationId xmlns:a16="http://schemas.microsoft.com/office/drawing/2014/main" id="{F68E7D1C-F7E8-AB40-828B-AAB46A83A8E6}"/>
+              </a:ext>
+            </a:extLst>
+          </p:cNvPr>
+          <p:cNvSpPr txBox="1">
+            <a:spLocks noChangeArrowheads="1"/>
+          </p:cNvSpPr>
+          <p:nvPr/>
+        </p:nvSpPr>
+        <p:spPr bwMode="auto">
+          <a:xfrm>
+            <a:off x="1603066" y="1988228"/>
+            <a:ext cx="123111" cy="322013"/>
+          </a:xfrm>
+          <a:prstGeom prst="rect">
+            <a:avLst/>
+          </a:prstGeom>
+          <a:noFill/>
+        </p:spPr>
+        <p:txBody>
+          <a:bodyPr vert="vert270" wrap="square" lIns="0" tIns="0" rIns="0" bIns="0" rtlCol="0">
+            <a:spAutoFit/>
+          </a:bodyPr>
+          <a:lstStyle>
+            <a:defPPr>
+              <a:defRPr lang="en-US"/>
+            </a:defPPr>
+            <a:lvl1pPr>
+              <a:defRPr sz="800"/>
+            </a:lvl1pPr>
+          </a:lstStyle>
+          <a:p>
+            <a:r>
+              <a:rPr lang="en-US" altLang="en-US" dirty="0"/>
+              <a:t>RAM</a:t>
+            </a:r>
+          </a:p>
+        </p:txBody>
+      </p:sp>
+      <p:sp>
+        <p:nvSpPr>
+          <p:cNvPr id="425" name="TextBox 9">
+            <a:extLst>
+              <a:ext uri="{FF2B5EF4-FFF2-40B4-BE49-F238E27FC236}">
+                <a16:creationId xmlns:a16="http://schemas.microsoft.com/office/drawing/2014/main" id="{664E3415-54D7-6F49-91E0-F72F823DD9E7}"/>
+              </a:ext>
+            </a:extLst>
+          </p:cNvPr>
+          <p:cNvSpPr txBox="1">
+            <a:spLocks noChangeArrowheads="1"/>
+          </p:cNvSpPr>
+          <p:nvPr/>
+        </p:nvSpPr>
+        <p:spPr bwMode="auto">
+          <a:xfrm>
+            <a:off x="1573886" y="4708729"/>
+            <a:ext cx="123111" cy="322013"/>
+          </a:xfrm>
+          <a:prstGeom prst="rect">
+            <a:avLst/>
+          </a:prstGeom>
+          <a:noFill/>
+        </p:spPr>
+        <p:txBody>
+          <a:bodyPr vert="vert270" wrap="square" lIns="0" tIns="0" rIns="0" bIns="0" rtlCol="0">
+            <a:spAutoFit/>
+          </a:bodyPr>
+          <a:lstStyle>
+            <a:defPPr>
+              <a:defRPr lang="en-US"/>
+            </a:defPPr>
+            <a:lvl1pPr>
+              <a:defRPr sz="800"/>
+            </a:lvl1pPr>
+          </a:lstStyle>
+          <a:p>
+            <a:r>
+              <a:rPr lang="en-US" altLang="en-US" dirty="0"/>
+              <a:t>RAM</a:t>
+            </a:r>
+          </a:p>
+        </p:txBody>
+      </p:sp>
+      <p:pic>
+        <p:nvPicPr>
+          <p:cNvPr id="427" name="Graphic 29">
+            <a:extLst>
+              <a:ext uri="{FF2B5EF4-FFF2-40B4-BE49-F238E27FC236}">
+                <a16:creationId xmlns:a16="http://schemas.microsoft.com/office/drawing/2014/main" id="{F1D188B7-CA33-E44A-8DE2-BA4185BCCA66}"/>
+              </a:ext>
+            </a:extLst>
+          </p:cNvPr>
+          <p:cNvPicPr>
+            <a:picLocks noChangeAspect="1" noChangeArrowheads="1"/>
+          </p:cNvPicPr>
+          <p:nvPr/>
+        </p:nvPicPr>
+        <p:blipFill>
+          <a:blip r:embed="rId21">
+            <a:extLst>
+              <a:ext uri="{28A0092B-C50C-407E-A947-70E740481C1C}">
+                <a14:useLocalDpi xmlns:a14="http://schemas.microsoft.com/office/drawing/2010/main" val="0"/>
+              </a:ext>
+            </a:extLst>
+          </a:blip>
+          <a:srcRect/>
+          <a:stretch>
+            <a:fillRect/>
+          </a:stretch>
+        </p:blipFill>
+        <p:spPr bwMode="auto">
+          <a:xfrm>
+            <a:off x="2219463" y="1553994"/>
+            <a:ext cx="216000" cy="216000"/>
+          </a:xfrm>
+          <a:prstGeom prst="rect">
+            <a:avLst/>
+          </a:prstGeom>
+          <a:noFill/>
+          <a:ln>
+            <a:noFill/>
+          </a:ln>
+          <a:extLst>
+            <a:ext uri="{909E8E84-426E-40DD-AFC4-6F175D3DCCD1}">
+              <a14:hiddenFill xmlns:a14="http://schemas.microsoft.com/office/drawing/2010/main">
+                <a:solidFill>
+                  <a:srgbClr val="FFFFFF"/>
+                </a:solidFill>
+              </a14:hiddenFill>
+            </a:ext>
+            <a:ext uri="{91240B29-F687-4F45-9708-019B960494DF}">
+              <a14:hiddenLine xmlns:a14="http://schemas.microsoft.com/office/drawing/2010/main" w="9525">
+                <a:solidFill>
+                  <a:srgbClr val="000000"/>
+                </a:solidFill>
+                <a:miter lim="800000"/>
+                <a:headEnd/>
+                <a:tailEnd/>
+              </a14:hiddenLine>
+            </a:ext>
+          </a:extLst>
+        </p:spPr>
+      </p:pic>
+      <p:pic>
+        <p:nvPicPr>
+          <p:cNvPr id="428" name="Graphic 29">
+            <a:extLst>
+              <a:ext uri="{FF2B5EF4-FFF2-40B4-BE49-F238E27FC236}">
+                <a16:creationId xmlns:a16="http://schemas.microsoft.com/office/drawing/2014/main" id="{774D4136-D733-5840-BC4E-D26848178007}"/>
+              </a:ext>
+            </a:extLst>
+          </p:cNvPr>
+          <p:cNvPicPr>
+            <a:picLocks noChangeAspect="1" noChangeArrowheads="1"/>
+          </p:cNvPicPr>
+          <p:nvPr/>
+        </p:nvPicPr>
+        <p:blipFill>
+          <a:blip r:embed="rId21">
+            <a:extLst>
+              <a:ext uri="{28A0092B-C50C-407E-A947-70E740481C1C}">
+                <a14:useLocalDpi xmlns:a14="http://schemas.microsoft.com/office/drawing/2010/main" val="0"/>
+              </a:ext>
+            </a:extLst>
+          </a:blip>
+          <a:srcRect/>
+          <a:stretch>
+            <a:fillRect/>
+          </a:stretch>
+        </p:blipFill>
+        <p:spPr bwMode="auto">
+          <a:xfrm>
+            <a:off x="2217265" y="2133676"/>
+            <a:ext cx="216000" cy="216000"/>
+          </a:xfrm>
+          <a:prstGeom prst="rect">
+            <a:avLst/>
+          </a:prstGeom>
+          <a:noFill/>
+          <a:ln>
+            <a:noFill/>
+          </a:ln>
+          <a:extLst>
+            <a:ext uri="{909E8E84-426E-40DD-AFC4-6F175D3DCCD1}">
+              <a14:hiddenFill xmlns:a14="http://schemas.microsoft.com/office/drawing/2010/main">
+                <a:solidFill>
+                  <a:srgbClr val="FFFFFF"/>
+                </a:solidFill>
+              </a14:hiddenFill>
+            </a:ext>
+            <a:ext uri="{91240B29-F687-4F45-9708-019B960494DF}">
+              <a14:hiddenLine xmlns:a14="http://schemas.microsoft.com/office/drawing/2010/main" w="9525">
+                <a:solidFill>
+                  <a:srgbClr val="000000"/>
+                </a:solidFill>
+                <a:miter lim="800000"/>
+                <a:headEnd/>
+                <a:tailEnd/>
+              </a14:hiddenLine>
+            </a:ext>
+          </a:extLst>
+        </p:spPr>
+      </p:pic>
+      <p:sp>
+        <p:nvSpPr>
+          <p:cNvPr id="429" name="Oval 428">
+            <a:extLst>
+              <a:ext uri="{FF2B5EF4-FFF2-40B4-BE49-F238E27FC236}">
+                <a16:creationId xmlns:a16="http://schemas.microsoft.com/office/drawing/2014/main" id="{A6913D72-0074-9746-BE72-9C548F803049}"/>
+              </a:ext>
+            </a:extLst>
+          </p:cNvPr>
+          <p:cNvSpPr/>
+          <p:nvPr/>
+        </p:nvSpPr>
+        <p:spPr>
+          <a:xfrm>
+            <a:off x="2458435" y="3750898"/>
+            <a:ext cx="177800" cy="177800"/>
+          </a:xfrm>
+          <a:prstGeom prst="ellipse">
+            <a:avLst/>
+          </a:prstGeom>
+          <a:solidFill>
+            <a:schemeClr val="accent6">
+              <a:lumMod val="50000"/>
+            </a:schemeClr>
+          </a:solidFill>
+          <a:ln>
+            <a:noFill/>
+          </a:ln>
+          <a:effectLst/>
+        </p:spPr>
+        <p:style>
+          <a:lnRef idx="1">
+            <a:schemeClr val="accent1"/>
+          </a:lnRef>
+          <a:fillRef idx="3">
+            <a:schemeClr val="accent1"/>
+          </a:fillRef>
+          <a:effectRef idx="2">
+            <a:schemeClr val="accent1"/>
+          </a:effectRef>
+          <a:fontRef idx="minor">
+            <a:schemeClr val="lt1"/>
+          </a:fontRef>
+        </p:style>
+        <p:txBody>
+          <a:bodyPr lIns="0" tIns="0" rIns="0" bIns="0" rtlCol="0" anchor="ctr"/>
+          <a:lstStyle/>
+          <a:p>
+            <a:pPr algn="ctr"/>
+            <a:r>
+              <a:rPr lang="en-US" sz="800" dirty="0"/>
+              <a:t>13</a:t>
+            </a:r>
+          </a:p>
+        </p:txBody>
+      </p:sp>
+      <p:sp>
+        <p:nvSpPr>
+          <p:cNvPr id="430" name="Oval 429">
+            <a:extLst>
+              <a:ext uri="{FF2B5EF4-FFF2-40B4-BE49-F238E27FC236}">
+                <a16:creationId xmlns:a16="http://schemas.microsoft.com/office/drawing/2014/main" id="{CB9BF4E4-2761-124A-B38E-DBA203385DC6}"/>
+              </a:ext>
+            </a:extLst>
+          </p:cNvPr>
+          <p:cNvSpPr/>
+          <p:nvPr/>
+        </p:nvSpPr>
+        <p:spPr>
+          <a:xfrm>
+            <a:off x="2039465" y="2151744"/>
+            <a:ext cx="177800" cy="177800"/>
+          </a:xfrm>
+          <a:prstGeom prst="ellipse">
+            <a:avLst/>
+          </a:prstGeom>
+          <a:solidFill>
+            <a:schemeClr val="accent6">
+              <a:lumMod val="50000"/>
+            </a:schemeClr>
+          </a:solidFill>
+          <a:ln>
+            <a:noFill/>
+          </a:ln>
+          <a:effectLst/>
+        </p:spPr>
+        <p:style>
+          <a:lnRef idx="1">
+            <a:schemeClr val="accent1"/>
+          </a:lnRef>
+          <a:fillRef idx="3">
+            <a:schemeClr val="accent1"/>
+          </a:fillRef>
+          <a:effectRef idx="2">
+            <a:schemeClr val="accent1"/>
+          </a:effectRef>
+          <a:fontRef idx="minor">
+            <a:schemeClr val="lt1"/>
+          </a:fontRef>
+        </p:style>
+        <p:txBody>
+          <a:bodyPr lIns="0" tIns="0" rIns="0" bIns="0" rtlCol="0" anchor="ctr"/>
+          <a:lstStyle/>
+          <a:p>
+            <a:pPr algn="ctr"/>
+            <a:r>
+              <a:rPr lang="en-US" sz="800" dirty="0"/>
+              <a:t>16</a:t>
+            </a:r>
+          </a:p>
+        </p:txBody>
+      </p:sp>
+      <p:sp>
+        <p:nvSpPr>
+          <p:cNvPr id="431" name="Oval 430">
+            <a:extLst>
+              <a:ext uri="{FF2B5EF4-FFF2-40B4-BE49-F238E27FC236}">
+                <a16:creationId xmlns:a16="http://schemas.microsoft.com/office/drawing/2014/main" id="{62B4E78F-8832-D14B-967F-6D042C0A2F19}"/>
+              </a:ext>
+            </a:extLst>
+          </p:cNvPr>
+          <p:cNvSpPr/>
+          <p:nvPr/>
+        </p:nvSpPr>
+        <p:spPr>
+          <a:xfrm>
+            <a:off x="893853" y="2388585"/>
+            <a:ext cx="177800" cy="177800"/>
+          </a:xfrm>
+          <a:prstGeom prst="ellipse">
+            <a:avLst/>
+          </a:prstGeom>
+          <a:solidFill>
+            <a:schemeClr val="accent6">
+              <a:lumMod val="50000"/>
+            </a:schemeClr>
+          </a:solidFill>
+          <a:ln>
+            <a:noFill/>
+          </a:ln>
+          <a:effectLst/>
+        </p:spPr>
+        <p:style>
+          <a:lnRef idx="1">
+            <a:schemeClr val="accent1"/>
+          </a:lnRef>
+          <a:fillRef idx="3">
+            <a:schemeClr val="accent1"/>
+          </a:fillRef>
+          <a:effectRef idx="2">
+            <a:schemeClr val="accent1"/>
+          </a:effectRef>
+          <a:fontRef idx="minor">
+            <a:schemeClr val="lt1"/>
+          </a:fontRef>
+        </p:style>
+        <p:txBody>
+          <a:bodyPr lIns="0" tIns="0" rIns="0" bIns="0" rtlCol="0" anchor="ctr"/>
+          <a:lstStyle/>
+          <a:p>
+            <a:pPr algn="ctr"/>
+            <a:r>
+              <a:rPr lang="en-US" sz="800" dirty="0"/>
+              <a:t>17</a:t>
+            </a:r>
+          </a:p>
+        </p:txBody>
+      </p:sp>
+      <p:sp>
+        <p:nvSpPr>
+          <p:cNvPr id="432" name="Oval 431">
+            <a:extLst>
+              <a:ext uri="{FF2B5EF4-FFF2-40B4-BE49-F238E27FC236}">
+                <a16:creationId xmlns:a16="http://schemas.microsoft.com/office/drawing/2014/main" id="{DB11B1D6-E141-B546-854E-8ACD9B2F5244}"/>
+              </a:ext>
+            </a:extLst>
+          </p:cNvPr>
+          <p:cNvSpPr/>
+          <p:nvPr/>
+        </p:nvSpPr>
+        <p:spPr>
+          <a:xfrm>
+            <a:off x="165806" y="3179630"/>
+            <a:ext cx="177800" cy="177800"/>
+          </a:xfrm>
+          <a:prstGeom prst="ellipse">
+            <a:avLst/>
+          </a:prstGeom>
+          <a:solidFill>
+            <a:schemeClr val="accent6">
+              <a:lumMod val="50000"/>
+            </a:schemeClr>
+          </a:solidFill>
+          <a:ln>
+            <a:noFill/>
+          </a:ln>
+          <a:effectLst/>
+        </p:spPr>
+        <p:style>
+          <a:lnRef idx="1">
+            <a:schemeClr val="accent1"/>
+          </a:lnRef>
+          <a:fillRef idx="3">
+            <a:schemeClr val="accent1"/>
+          </a:fillRef>
+          <a:effectRef idx="2">
+            <a:schemeClr val="accent1"/>
+          </a:effectRef>
+          <a:fontRef idx="minor">
+            <a:schemeClr val="lt1"/>
+          </a:fontRef>
+        </p:style>
+        <p:txBody>
+          <a:bodyPr lIns="0" tIns="0" rIns="0" bIns="0" rtlCol="0" anchor="ctr"/>
+          <a:lstStyle/>
+          <a:p>
+            <a:pPr algn="ctr"/>
+            <a:r>
+              <a:rPr lang="en-US" sz="800" dirty="0"/>
+              <a:t>18</a:t>
+            </a:r>
+          </a:p>
+        </p:txBody>
+      </p:sp>
+      <p:sp>
+        <p:nvSpPr>
+          <p:cNvPr id="433" name="Oval 432">
+            <a:extLst>
+              <a:ext uri="{FF2B5EF4-FFF2-40B4-BE49-F238E27FC236}">
+                <a16:creationId xmlns:a16="http://schemas.microsoft.com/office/drawing/2014/main" id="{4FB7B732-C732-E246-96D7-E29F2CC86A31}"/>
+              </a:ext>
+            </a:extLst>
+          </p:cNvPr>
+          <p:cNvSpPr/>
+          <p:nvPr/>
+        </p:nvSpPr>
+        <p:spPr>
+          <a:xfrm>
+            <a:off x="4189166" y="4452170"/>
+            <a:ext cx="177800" cy="177800"/>
+          </a:xfrm>
+          <a:prstGeom prst="ellipse">
+            <a:avLst/>
+          </a:prstGeom>
+          <a:solidFill>
+            <a:schemeClr val="accent6">
+              <a:lumMod val="50000"/>
+            </a:schemeClr>
+          </a:solidFill>
+          <a:ln>
+            <a:noFill/>
+          </a:ln>
+          <a:effectLst/>
+        </p:spPr>
+        <p:style>
+          <a:lnRef idx="1">
+            <a:schemeClr val="accent1"/>
+          </a:lnRef>
+          <a:fillRef idx="3">
+            <a:schemeClr val="accent1"/>
+          </a:fillRef>
+          <a:effectRef idx="2">
+            <a:schemeClr val="accent1"/>
+          </a:effectRef>
+          <a:fontRef idx="minor">
+            <a:schemeClr val="lt1"/>
+          </a:fontRef>
+        </p:style>
+        <p:txBody>
+          <a:bodyPr lIns="0" tIns="0" rIns="0" bIns="0" rtlCol="0" anchor="ctr"/>
+          <a:lstStyle/>
+          <a:p>
+            <a:pPr algn="ctr"/>
+            <a:r>
+              <a:rPr lang="en-US" sz="800" dirty="0"/>
+              <a:t>19</a:t>
+            </a:r>
+          </a:p>
+        </p:txBody>
+      </p:sp>
+      <p:sp>
+        <p:nvSpPr>
+          <p:cNvPr id="434" name="Oval 433">
+            <a:extLst>
+              <a:ext uri="{FF2B5EF4-FFF2-40B4-BE49-F238E27FC236}">
+                <a16:creationId xmlns:a16="http://schemas.microsoft.com/office/drawing/2014/main" id="{358BAE58-B35B-7B44-A4DB-71C5752E7DB0}"/>
+              </a:ext>
+            </a:extLst>
+          </p:cNvPr>
+          <p:cNvSpPr/>
+          <p:nvPr/>
+        </p:nvSpPr>
+        <p:spPr>
+          <a:xfrm>
+            <a:off x="5148713" y="4490056"/>
+            <a:ext cx="177800" cy="177800"/>
+          </a:xfrm>
+          <a:prstGeom prst="ellipse">
+            <a:avLst/>
+          </a:prstGeom>
+          <a:solidFill>
+            <a:schemeClr val="accent6">
+              <a:lumMod val="50000"/>
+            </a:schemeClr>
+          </a:solidFill>
+          <a:ln>
+            <a:noFill/>
+          </a:ln>
+          <a:effectLst/>
+        </p:spPr>
+        <p:style>
+          <a:lnRef idx="1">
+            <a:schemeClr val="accent1"/>
+          </a:lnRef>
+          <a:fillRef idx="3">
+            <a:schemeClr val="accent1"/>
+          </a:fillRef>
+          <a:effectRef idx="2">
+            <a:schemeClr val="accent1"/>
+          </a:effectRef>
+          <a:fontRef idx="minor">
+            <a:schemeClr val="lt1"/>
+          </a:fontRef>
+        </p:style>
+        <p:txBody>
+          <a:bodyPr lIns="0" tIns="0" rIns="0" bIns="0" rtlCol="0" anchor="ctr"/>
+          <a:lstStyle/>
+          <a:p>
+            <a:pPr algn="ctr"/>
+            <a:r>
+              <a:rPr lang="en-US" sz="800" dirty="0"/>
+              <a:t>20</a:t>
             </a:r>
           </a:p>
         </p:txBody>

</xml_diff>